<commit_message>
added presentation format proposal
</commit_message>
<xml_diff>
--- a/deliverables/Enhancing_School_Administration_through_Data_Informed_Decision_Making-revised.pptx
+++ b/deliverables/Enhancing_School_Administration_through_Data_Informed_Decision_Making-revised.pptx
@@ -8,8 +8,8 @@
     <p:sldId id="257" r:id="rId5"/>
     <p:sldId id="259" r:id="rId6"/>
     <p:sldId id="290" r:id="rId7"/>
-    <p:sldId id="291" r:id="rId8"/>
-    <p:sldId id="282" r:id="rId9"/>
+    <p:sldId id="282" r:id="rId8"/>
+    <p:sldId id="291" r:id="rId9"/>
     <p:sldId id="281" r:id="rId10"/>
     <p:sldId id="283" r:id="rId11"/>
     <p:sldId id="284" r:id="rId12"/>
@@ -11698,123 +11698,6 @@
     <p:bg>
       <p:bgPr>
         <a:solidFill>
-          <a:schemeClr val="bg2"/>
-        </a:solidFill>
-        <a:effectLst/>
-      </p:bgPr>
-    </p:bg>
-    <p:spTree>
-      <p:nvGrpSpPr>
-        <p:cNvPr id="1" name=""/>
-        <p:cNvGrpSpPr/>
-        <p:nvPr/>
-      </p:nvGrpSpPr>
-      <p:grpSpPr>
-        <a:xfrm>
-          <a:off x="0" y="0"/>
-          <a:ext cx="0" cy="0"/>
-          <a:chOff x="0" y="0"/>
-          <a:chExt cx="0" cy="0"/>
-        </a:xfrm>
-      </p:grpSpPr>
-      <p:sp>
-        <p:nvSpPr>
-          <p:cNvPr id="2" name="Title 1">
-            <a:extLst>
-              <a:ext uri="{FF2B5EF4-FFF2-40B4-BE49-F238E27FC236}">
-                <a16:creationId xmlns:a16="http://schemas.microsoft.com/office/drawing/2014/main" id="{0B71E191-A3AA-3284-9D4F-F4AB8DE39CD5}"/>
-              </a:ext>
-            </a:extLst>
-          </p:cNvPr>
-          <p:cNvSpPr>
-            <a:spLocks noGrp="1"/>
-          </p:cNvSpPr>
-          <p:nvPr>
-            <p:ph type="title"/>
-          </p:nvPr>
-        </p:nvSpPr>
-        <p:spPr>
-          <a:xfrm>
-            <a:off x="810000" y="447187"/>
-            <a:ext cx="10715250" cy="1238737"/>
-          </a:xfrm>
-        </p:spPr>
-        <p:txBody>
-          <a:bodyPr/>
-          <a:lstStyle/>
-          <a:p>
-            <a:r>
-              <a:rPr lang="en-US" dirty="0"/>
-              <a:t>Data-informed Decision Making vs Intuition-Based Decision Making</a:t>
-            </a:r>
-          </a:p>
-        </p:txBody>
-      </p:sp>
-      <p:sp>
-        <p:nvSpPr>
-          <p:cNvPr id="3" name="Content Placeholder 2">
-            <a:extLst>
-              <a:ext uri="{FF2B5EF4-FFF2-40B4-BE49-F238E27FC236}">
-                <a16:creationId xmlns:a16="http://schemas.microsoft.com/office/drawing/2014/main" id="{41782570-D4E4-1B1A-E5D7-49950CA5921E}"/>
-              </a:ext>
-            </a:extLst>
-          </p:cNvPr>
-          <p:cNvSpPr>
-            <a:spLocks noGrp="1"/>
-          </p:cNvSpPr>
-          <p:nvPr>
-            <p:ph idx="1"/>
-          </p:nvPr>
-        </p:nvSpPr>
-        <p:spPr/>
-        <p:txBody>
-          <a:bodyPr/>
-          <a:lstStyle/>
-          <a:p>
-            <a:r>
-              <a:rPr lang="en-US" dirty="0"/>
-              <a:t>Objectivity</a:t>
-            </a:r>
-          </a:p>
-          <a:p>
-            <a:r>
-              <a:rPr lang="en-US" dirty="0"/>
-              <a:t>Evidence-based</a:t>
-            </a:r>
-          </a:p>
-          <a:p>
-            <a:r>
-              <a:rPr lang="en-US" dirty="0"/>
-              <a:t>Bias</a:t>
-            </a:r>
-          </a:p>
-          <a:p>
-            <a:r>
-              <a:rPr lang="en-US" dirty="0"/>
-              <a:t>Inspires confidence in decision making (know your facts)</a:t>
-            </a:r>
-          </a:p>
-        </p:txBody>
-      </p:sp>
-    </p:spTree>
-    <p:extLst>
-      <p:ext uri="{BB962C8B-B14F-4D97-AF65-F5344CB8AC3E}">
-        <p14:creationId xmlns:p14="http://schemas.microsoft.com/office/powerpoint/2010/main" val="2017298897"/>
-      </p:ext>
-    </p:extLst>
-  </p:cSld>
-  <p:clrMapOvr>
-    <a:masterClrMapping/>
-  </p:clrMapOvr>
-</p:sld>
-</file>
-
-<file path=ppt/slides/slide5.xml><?xml version="1.0" encoding="utf-8"?>
-<p:sld xmlns:a="http://schemas.openxmlformats.org/drawingml/2006/main" xmlns:r="http://schemas.openxmlformats.org/officeDocument/2006/relationships" xmlns:p="http://schemas.openxmlformats.org/presentationml/2006/main">
-  <p:cSld>
-    <p:bg>
-      <p:bgPr>
-        <a:solidFill>
           <a:schemeClr val="bg1"/>
         </a:solidFill>
         <a:effectLst/>
@@ -12302,6 +12185,137 @@
 </p:sld>
 </file>
 
+<file path=ppt/slides/slide5.xml><?xml version="1.0" encoding="utf-8"?>
+<p:sld xmlns:a="http://schemas.openxmlformats.org/drawingml/2006/main" xmlns:r="http://schemas.openxmlformats.org/officeDocument/2006/relationships" xmlns:p="http://schemas.openxmlformats.org/presentationml/2006/main">
+  <p:cSld>
+    <p:bg>
+      <p:bgPr>
+        <a:solidFill>
+          <a:schemeClr val="bg2"/>
+        </a:solidFill>
+        <a:effectLst/>
+      </p:bgPr>
+    </p:bg>
+    <p:spTree>
+      <p:nvGrpSpPr>
+        <p:cNvPr id="1" name=""/>
+        <p:cNvGrpSpPr/>
+        <p:nvPr/>
+      </p:nvGrpSpPr>
+      <p:grpSpPr>
+        <a:xfrm>
+          <a:off x="0" y="0"/>
+          <a:ext cx="0" cy="0"/>
+          <a:chOff x="0" y="0"/>
+          <a:chExt cx="0" cy="0"/>
+        </a:xfrm>
+      </p:grpSpPr>
+      <p:sp>
+        <p:nvSpPr>
+          <p:cNvPr id="2" name="Title 1">
+            <a:extLst>
+              <a:ext uri="{FF2B5EF4-FFF2-40B4-BE49-F238E27FC236}">
+                <a16:creationId xmlns:a16="http://schemas.microsoft.com/office/drawing/2014/main" id="{0B71E191-A3AA-3284-9D4F-F4AB8DE39CD5}"/>
+              </a:ext>
+            </a:extLst>
+          </p:cNvPr>
+          <p:cNvSpPr>
+            <a:spLocks noGrp="1"/>
+          </p:cNvSpPr>
+          <p:nvPr>
+            <p:ph type="title"/>
+          </p:nvPr>
+        </p:nvSpPr>
+        <p:spPr>
+          <a:xfrm>
+            <a:off x="810000" y="447187"/>
+            <a:ext cx="10715250" cy="1238737"/>
+          </a:xfrm>
+        </p:spPr>
+        <p:txBody>
+          <a:bodyPr/>
+          <a:lstStyle/>
+          <a:p>
+            <a:r>
+              <a:rPr lang="en-US" dirty="0"/>
+              <a:t>Data-informed Decision Making vs Intuition-Based Decision Making</a:t>
+            </a:r>
+          </a:p>
+        </p:txBody>
+      </p:sp>
+      <p:sp>
+        <p:nvSpPr>
+          <p:cNvPr id="3" name="Content Placeholder 2">
+            <a:extLst>
+              <a:ext uri="{FF2B5EF4-FFF2-40B4-BE49-F238E27FC236}">
+                <a16:creationId xmlns:a16="http://schemas.microsoft.com/office/drawing/2014/main" id="{41782570-D4E4-1B1A-E5D7-49950CA5921E}"/>
+              </a:ext>
+            </a:extLst>
+          </p:cNvPr>
+          <p:cNvSpPr>
+            <a:spLocks noGrp="1"/>
+          </p:cNvSpPr>
+          <p:nvPr>
+            <p:ph idx="1"/>
+          </p:nvPr>
+        </p:nvSpPr>
+        <p:spPr>
+          <a:xfrm>
+            <a:off x="818712" y="2222287"/>
+            <a:ext cx="10554574" cy="3853198"/>
+          </a:xfrm>
+        </p:spPr>
+        <p:txBody>
+          <a:bodyPr/>
+          <a:lstStyle/>
+          <a:p>
+            <a:endParaRPr lang="en-US" dirty="0"/>
+          </a:p>
+          <a:p>
+            <a:r>
+              <a:rPr lang="en-US" dirty="0"/>
+              <a:t>Data-informed decision making makes use of historical data to guide decision making as opposed to intuition-based decision making which relies of past experiences and knowledge of the decision maker.</a:t>
+            </a:r>
+          </a:p>
+          <a:p>
+            <a:r>
+              <a:rPr lang="en-US" dirty="0"/>
+              <a:t>Objectivity(Fact)</a:t>
+            </a:r>
+          </a:p>
+          <a:p>
+            <a:r>
+              <a:rPr lang="en-US" dirty="0"/>
+              <a:t>Evidence-based</a:t>
+            </a:r>
+          </a:p>
+          <a:p>
+            <a:r>
+              <a:rPr lang="en-US" dirty="0"/>
+              <a:t>Bias</a:t>
+            </a:r>
+          </a:p>
+          <a:p>
+            <a:r>
+              <a:rPr lang="en-US" dirty="0"/>
+              <a:t>Inspires confidence in decision making (know your facts)</a:t>
+            </a:r>
+          </a:p>
+        </p:txBody>
+      </p:sp>
+    </p:spTree>
+    <p:extLst>
+      <p:ext uri="{BB962C8B-B14F-4D97-AF65-F5344CB8AC3E}">
+        <p14:creationId xmlns:p14="http://schemas.microsoft.com/office/powerpoint/2010/main" val="2017298897"/>
+      </p:ext>
+    </p:extLst>
+  </p:cSld>
+  <p:clrMapOvr>
+    <a:masterClrMapping/>
+  </p:clrMapOvr>
+</p:sld>
+</file>
+
 <file path=ppt/slides/slide6.xml><?xml version="1.0" encoding="utf-8"?>
 <p:sld xmlns:a="http://schemas.openxmlformats.org/drawingml/2006/main" xmlns:r="http://schemas.openxmlformats.org/officeDocument/2006/relationships" xmlns:p="http://schemas.openxmlformats.org/presentationml/2006/main">
   <p:cSld>
@@ -12437,6 +12451,15 @@
         <p:txBody>
           <a:bodyPr/>
           <a:lstStyle/>
+          <a:p>
+            <a:r>
+              <a:rPr lang="en-US"/>
+              <a:t>Web-based</a:t>
+            </a:r>
+          </a:p>
+          <a:p>
+            <a:endParaRPr lang="en-US" dirty="0"/>
+          </a:p>
           <a:p>
             <a:r>
               <a:rPr lang="en-US" dirty="0"/>
@@ -13480,7 +13503,7 @@
         <p:spPr>
           <a:xfrm>
             <a:off x="216418" y="961100"/>
-            <a:ext cx="7122160" cy="2862322"/>
+            <a:ext cx="7122160" cy="3693319"/>
           </a:xfrm>
           <a:prstGeom prst="rect">
             <a:avLst/>
@@ -13508,6 +13531,18 @@
             <a:r>
               <a:rPr lang="en-US" dirty="0"/>
               <a:t>Security.</a:t>
+            </a:r>
+          </a:p>
+          <a:p>
+            <a:endParaRPr lang="en-US" dirty="0"/>
+          </a:p>
+          <a:p>
+            <a:endParaRPr lang="en-US" dirty="0"/>
+          </a:p>
+          <a:p>
+            <a:r>
+              <a:rPr lang="en-US" dirty="0"/>
+              <a:t>Scalability.</a:t>
             </a:r>
           </a:p>
           <a:p>
@@ -13787,6 +13822,24 @@
 </file>
 
 <file path=customXml/item1.xml><?xml version="1.0" encoding="utf-8"?>
+<p:properties xmlns:p="http://schemas.microsoft.com/office/2006/metadata/properties" xmlns:xsi="http://www.w3.org/2001/XMLSchema-instance" xmlns:pc="http://schemas.microsoft.com/office/infopath/2007/PartnerControls">
+  <documentManagement>
+    <Status xmlns="71af3243-3dd4-4a8d-8c0d-dd76da1f02a5">Not started</Status>
+    <MediaServiceKeyPoints xmlns="71af3243-3dd4-4a8d-8c0d-dd76da1f02a5" xsi:nil="true"/>
+  </documentManagement>
+</p:properties>
+</file>
+
+<file path=customXml/item2.xml><?xml version="1.0" encoding="utf-8"?>
+<?mso-contentType ?>
+<FormTemplates xmlns="http://schemas.microsoft.com/sharepoint/v3/contenttype/forms">
+  <Display>DocumentLibraryForm</Display>
+  <Edit>DocumentLibraryForm</Edit>
+  <New>DocumentLibraryForm</New>
+</FormTemplates>
+</file>
+
+<file path=customXml/item3.xml><?xml version="1.0" encoding="utf-8"?>
 <ct:contentTypeSchema xmlns:ct="http://schemas.microsoft.com/office/2006/metadata/contentType" xmlns:ma="http://schemas.microsoft.com/office/2006/metadata/properties/metaAttributes" ct:_="" ma:_="" ma:contentTypeName="Document" ma:contentTypeID="0x01010079F111ED35F8CC479449609E8A0923A6" ma:contentTypeVersion="12" ma:contentTypeDescription="Create a new document." ma:contentTypeScope="" ma:versionID="93813dd7ca6ad654711aa0ab317e03a3">
   <xsd:schema xmlns:xsd="http://www.w3.org/2001/XMLSchema" xmlns:xs="http://www.w3.org/2001/XMLSchema" xmlns:p="http://schemas.microsoft.com/office/2006/metadata/properties" xmlns:ns2="71af3243-3dd4-4a8d-8c0d-dd76da1f02a5" xmlns:ns3="16c05727-aa75-4e4a-9b5f-8a80a1165891" targetNamespace="http://schemas.microsoft.com/office/2006/metadata/properties" ma:root="true" ma:fieldsID="f11dc0ce689dd3925e84e4e35398c6e7" ns2:_="" ns3:_="">
     <xsd:import namespace="71af3243-3dd4-4a8d-8c0d-dd76da1f02a5"/>
@@ -14007,25 +14060,25 @@
 </ct:contentTypeSchema>
 </file>
 
-<file path=customXml/item2.xml><?xml version="1.0" encoding="utf-8"?>
-<p:properties xmlns:p="http://schemas.microsoft.com/office/2006/metadata/properties" xmlns:xsi="http://www.w3.org/2001/XMLSchema-instance" xmlns:pc="http://schemas.microsoft.com/office/infopath/2007/PartnerControls">
-  <documentManagement>
-    <Status xmlns="71af3243-3dd4-4a8d-8c0d-dd76da1f02a5">Not started</Status>
-    <MediaServiceKeyPoints xmlns="71af3243-3dd4-4a8d-8c0d-dd76da1f02a5" xsi:nil="true"/>
-  </documentManagement>
-</p:properties>
+<file path=customXml/itemProps1.xml><?xml version="1.0" encoding="utf-8"?>
+<ds:datastoreItem xmlns:ds="http://schemas.openxmlformats.org/officeDocument/2006/customXml" ds:itemID="{5E15C130-17B0-43C9-B99C-584294C40B51}">
+  <ds:schemaRefs>
+    <ds:schemaRef ds:uri="http://schemas.microsoft.com/office/2006/metadata/properties"/>
+    <ds:schemaRef ds:uri="http://schemas.microsoft.com/office/infopath/2007/PartnerControls"/>
+    <ds:schemaRef ds:uri="71af3243-3dd4-4a8d-8c0d-dd76da1f02a5"/>
+  </ds:schemaRefs>
+</ds:datastoreItem>
 </file>
 
-<file path=customXml/item3.xml><?xml version="1.0" encoding="utf-8"?>
-<?mso-contentType ?>
-<FormTemplates xmlns="http://schemas.microsoft.com/sharepoint/v3/contenttype/forms">
-  <Display>DocumentLibraryForm</Display>
-  <Edit>DocumentLibraryForm</Edit>
-  <New>DocumentLibraryForm</New>
-</FormTemplates>
+<file path=customXml/itemProps2.xml><?xml version="1.0" encoding="utf-8"?>
+<ds:datastoreItem xmlns:ds="http://schemas.openxmlformats.org/officeDocument/2006/customXml" ds:itemID="{6E1812AF-5C4C-4B75-9015-C90088D3D4BF}">
+  <ds:schemaRefs>
+    <ds:schemaRef ds:uri="http://schemas.microsoft.com/sharepoint/v3/contenttype/forms"/>
+  </ds:schemaRefs>
+</ds:datastoreItem>
 </file>
 
-<file path=customXml/itemProps1.xml><?xml version="1.0" encoding="utf-8"?>
+<file path=customXml/itemProps3.xml><?xml version="1.0" encoding="utf-8"?>
 <ds:datastoreItem xmlns:ds="http://schemas.openxmlformats.org/officeDocument/2006/customXml" ds:itemID="{BF0B771C-53D0-4C6A-8C2A-F95E45907FFE}">
   <ds:schemaRefs>
     <ds:schemaRef ds:uri="http://schemas.microsoft.com/office/2006/metadata/contentType"/>
@@ -14042,22 +14095,4 @@
     <ds:schemaRef ds:uri="http://schemas.microsoft.com/internal/obd"/>
   </ds:schemaRefs>
 </ds:datastoreItem>
-</file>
-
-<file path=customXml/itemProps2.xml><?xml version="1.0" encoding="utf-8"?>
-<ds:datastoreItem xmlns:ds="http://schemas.openxmlformats.org/officeDocument/2006/customXml" ds:itemID="{5E15C130-17B0-43C9-B99C-584294C40B51}">
-  <ds:schemaRefs>
-    <ds:schemaRef ds:uri="http://schemas.microsoft.com/office/2006/metadata/properties"/>
-    <ds:schemaRef ds:uri="http://schemas.microsoft.com/office/infopath/2007/PartnerControls"/>
-    <ds:schemaRef ds:uri="71af3243-3dd4-4a8d-8c0d-dd76da1f02a5"/>
-  </ds:schemaRefs>
-</ds:datastoreItem>
-</file>
-
-<file path=customXml/itemProps3.xml><?xml version="1.0" encoding="utf-8"?>
-<ds:datastoreItem xmlns:ds="http://schemas.openxmlformats.org/officeDocument/2006/customXml" ds:itemID="{6E1812AF-5C4C-4B75-9015-C90088D3D4BF}">
-  <ds:schemaRefs>
-    <ds:schemaRef ds:uri="http://schemas.microsoft.com/sharepoint/v3/contenttype/forms"/>
-  </ds:schemaRefs>
-</ds:datastoreItem>
 </file>
</xml_diff>